<commit_message>
Update lecture_03_2021.pptx for 2021222
</commit_message>
<xml_diff>
--- a/extras/lecture_03_2021.pptx
+++ b/extras/lecture_03_2021.pptx
@@ -205,7 +205,7 @@
           <a:p>
             <a:fld id="{3F78BFC6-A9F1-44A0-8780-C460B80C8AA5}" type="datetimeFigureOut">
               <a:rPr lang="en-GB" smtClean="0"/>
-              <a:t>20/09/2021</a:t>
+              <a:t>28/02/2022</a:t>
             </a:fld>
             <a:endParaRPr lang="en-GB"/>
           </a:p>
@@ -18355,11 +18355,11 @@
             <a:pPr algn="l"/>
             <a:r>
               <a:rPr lang="en-GB" sz="3200" dirty="0"/>
-              <a:t>2021 </a:t>
+              <a:t>2022 </a:t>
             </a:r>
             <a:r>
               <a:rPr lang="en-GB" sz="3200" dirty="0" err="1"/>
-              <a:t>ősz</a:t>
+              <a:t>tavasz</a:t>
             </a:r>
             <a:endParaRPr lang="en-US" sz="3200" dirty="0"/>
           </a:p>
@@ -21446,6 +21446,56 @@
 </file>
 
 <file path=customXml/item1.xml><?xml version="1.0" encoding="utf-8"?>
+<?mso-contentType ?>
+<spe:Receivers xmlns:spe="http://schemas.microsoft.com/sharepoint/events">
+  <Receiver>
+    <Name>Document ID Generator</Name>
+    <Synchronization>Synchronous</Synchronization>
+    <Type>10001</Type>
+    <SequenceNumber>1000</SequenceNumber>
+    <Url/>
+    <Assembly>Microsoft.Office.DocumentManagement, Version=16.0.0.0, Culture=neutral, PublicKeyToken=71e9bce111e9429c</Assembly>
+    <Class>Microsoft.Office.DocumentManagement.Internal.DocIdHandler</Class>
+    <Data/>
+    <Filter/>
+  </Receiver>
+  <Receiver>
+    <Name>Document ID Generator</Name>
+    <Synchronization>Synchronous</Synchronization>
+    <Type>10002</Type>
+    <SequenceNumber>1001</SequenceNumber>
+    <Url/>
+    <Assembly>Microsoft.Office.DocumentManagement, Version=16.0.0.0, Culture=neutral, PublicKeyToken=71e9bce111e9429c</Assembly>
+    <Class>Microsoft.Office.DocumentManagement.Internal.DocIdHandler</Class>
+    <Data/>
+    <Filter/>
+  </Receiver>
+  <Receiver>
+    <Name>Document ID Generator</Name>
+    <Synchronization>Synchronous</Synchronization>
+    <Type>10004</Type>
+    <SequenceNumber>1002</SequenceNumber>
+    <Url/>
+    <Assembly>Microsoft.Office.DocumentManagement, Version=16.0.0.0, Culture=neutral, PublicKeyToken=71e9bce111e9429c</Assembly>
+    <Class>Microsoft.Office.DocumentManagement.Internal.DocIdHandler</Class>
+    <Data/>
+    <Filter/>
+  </Receiver>
+  <Receiver>
+    <Name>Document ID Generator</Name>
+    <Synchronization>Synchronous</Synchronization>
+    <Type>10006</Type>
+    <SequenceNumber>1003</SequenceNumber>
+    <Url/>
+    <Assembly>Microsoft.Office.DocumentManagement, Version=16.0.0.0, Culture=neutral, PublicKeyToken=71e9bce111e9429c</Assembly>
+    <Class>Microsoft.Office.DocumentManagement.Internal.DocIdHandler</Class>
+    <Data/>
+    <Filter/>
+  </Receiver>
+</spe:Receivers>
+</file>
+
+<file path=customXml/item2.xml><?xml version="1.0" encoding="utf-8"?>
 <ct:contentTypeSchema xmlns:ct="http://schemas.microsoft.com/office/2006/metadata/contentType" xmlns:ma="http://schemas.microsoft.com/office/2006/metadata/properties/metaAttributes" ct:_="" ma:_="" ma:contentTypeName="Document" ma:contentTypeID="0x01010021F0ECD861B6C24D9DE6C610410A9680" ma:contentTypeVersion="11" ma:contentTypeDescription="Create a new document." ma:contentTypeScope="" ma:versionID="c1e6361be1704c346fd95d433b8f96cc">
   <xsd:schema xmlns:xsd="http://www.w3.org/2001/XMLSchema" xmlns:xs="http://www.w3.org/2001/XMLSchema" xmlns:p="http://schemas.microsoft.com/office/2006/metadata/properties" xmlns:ns1="http://schemas.microsoft.com/sharepoint/v3" xmlns:ns2="8f2d48a8-3d15-4a9a-bc6b-e84b4fa59525" xmlns:ns3="843bd4ae-105e-484a-97ba-9cfb3101a146" targetNamespace="http://schemas.microsoft.com/office/2006/metadata/properties" ma:root="true" ma:fieldsID="b37878c8533b0244faa46792825990a5" ns1:_="" ns2:_="" ns3:_="">
     <xsd:import namespace="http://schemas.microsoft.com/sharepoint/v3"/>
@@ -21690,57 +21740,16 @@
 </ct:contentTypeSchema>
 </file>
 
-<file path=customXml/item2.xml><?xml version="1.0" encoding="utf-8"?>
+<file path=customXml/item3.xml><?xml version="1.0" encoding="utf-8"?>
 <?mso-contentType ?>
-<spe:Receivers xmlns:spe="http://schemas.microsoft.com/sharepoint/events">
-  <Receiver>
-    <Name>Document ID Generator</Name>
-    <Synchronization>Synchronous</Synchronization>
-    <Type>10001</Type>
-    <SequenceNumber>1000</SequenceNumber>
-    <Url/>
-    <Assembly>Microsoft.Office.DocumentManagement, Version=16.0.0.0, Culture=neutral, PublicKeyToken=71e9bce111e9429c</Assembly>
-    <Class>Microsoft.Office.DocumentManagement.Internal.DocIdHandler</Class>
-    <Data/>
-    <Filter/>
-  </Receiver>
-  <Receiver>
-    <Name>Document ID Generator</Name>
-    <Synchronization>Synchronous</Synchronization>
-    <Type>10002</Type>
-    <SequenceNumber>1001</SequenceNumber>
-    <Url/>
-    <Assembly>Microsoft.Office.DocumentManagement, Version=16.0.0.0, Culture=neutral, PublicKeyToken=71e9bce111e9429c</Assembly>
-    <Class>Microsoft.Office.DocumentManagement.Internal.DocIdHandler</Class>
-    <Data/>
-    <Filter/>
-  </Receiver>
-  <Receiver>
-    <Name>Document ID Generator</Name>
-    <Synchronization>Synchronous</Synchronization>
-    <Type>10004</Type>
-    <SequenceNumber>1002</SequenceNumber>
-    <Url/>
-    <Assembly>Microsoft.Office.DocumentManagement, Version=16.0.0.0, Culture=neutral, PublicKeyToken=71e9bce111e9429c</Assembly>
-    <Class>Microsoft.Office.DocumentManagement.Internal.DocIdHandler</Class>
-    <Data/>
-    <Filter/>
-  </Receiver>
-  <Receiver>
-    <Name>Document ID Generator</Name>
-    <Synchronization>Synchronous</Synchronization>
-    <Type>10006</Type>
-    <SequenceNumber>1003</SequenceNumber>
-    <Url/>
-    <Assembly>Microsoft.Office.DocumentManagement, Version=16.0.0.0, Culture=neutral, PublicKeyToken=71e9bce111e9429c</Assembly>
-    <Class>Microsoft.Office.DocumentManagement.Internal.DocIdHandler</Class>
-    <Data/>
-    <Filter/>
-  </Receiver>
-</spe:Receivers>
+<FormTemplates xmlns="http://schemas.microsoft.com/sharepoint/v3/contenttype/forms">
+  <Display>DocumentLibraryForm</Display>
+  <Edit>DocumentLibraryForm</Edit>
+  <New>DocumentLibraryForm</New>
+</FormTemplates>
 </file>
 
-<file path=customXml/item3.xml><?xml version="1.0" encoding="utf-8"?>
+<file path=customXml/item4.xml><?xml version="1.0" encoding="utf-8"?>
 <p:properties xmlns:p="http://schemas.microsoft.com/office/2006/metadata/properties" xmlns:xsi="http://www.w3.org/2001/XMLSchema-instance" xmlns:pc="http://schemas.microsoft.com/office/infopath/2007/PartnerControls">
   <documentManagement>
     <SharedWithUsers xmlns="843bd4ae-105e-484a-97ba-9cfb3101a146">
@@ -21761,16 +21770,15 @@
 </p:properties>
 </file>
 
-<file path=customXml/item4.xml><?xml version="1.0" encoding="utf-8"?>
-<?mso-contentType ?>
-<FormTemplates xmlns="http://schemas.microsoft.com/sharepoint/v3/contenttype/forms">
-  <Display>DocumentLibraryForm</Display>
-  <Edit>DocumentLibraryForm</Edit>
-  <New>DocumentLibraryForm</New>
-</FormTemplates>
+<file path=customXml/itemProps1.xml><?xml version="1.0" encoding="utf-8"?>
+<ds:datastoreItem xmlns:ds="http://schemas.openxmlformats.org/officeDocument/2006/customXml" ds:itemID="{8D554448-F89C-4C8D-AEBC-43921BA3BA45}">
+  <ds:schemaRefs>
+    <ds:schemaRef ds:uri="http://schemas.microsoft.com/sharepoint/events"/>
+  </ds:schemaRefs>
+</ds:datastoreItem>
 </file>
 
-<file path=customXml/itemProps1.xml><?xml version="1.0" encoding="utf-8"?>
+<file path=customXml/itemProps2.xml><?xml version="1.0" encoding="utf-8"?>
 <ds:datastoreItem xmlns:ds="http://schemas.openxmlformats.org/officeDocument/2006/customXml" ds:itemID="{5E17CC5E-31FE-4495-9412-9CA01119BB3F}">
   <ds:schemaRefs>
     <ds:schemaRef ds:uri="http://schemas.microsoft.com/office/2006/metadata/contentType"/>
@@ -21790,15 +21798,15 @@
 </ds:datastoreItem>
 </file>
 
-<file path=customXml/itemProps2.xml><?xml version="1.0" encoding="utf-8"?>
-<ds:datastoreItem xmlns:ds="http://schemas.openxmlformats.org/officeDocument/2006/customXml" ds:itemID="{8D554448-F89C-4C8D-AEBC-43921BA3BA45}">
+<file path=customXml/itemProps3.xml><?xml version="1.0" encoding="utf-8"?>
+<ds:datastoreItem xmlns:ds="http://schemas.openxmlformats.org/officeDocument/2006/customXml" ds:itemID="{32659024-6793-4229-A8F7-FFA3A70DC1AD}">
   <ds:schemaRefs>
-    <ds:schemaRef ds:uri="http://schemas.microsoft.com/sharepoint/events"/>
+    <ds:schemaRef ds:uri="http://schemas.microsoft.com/sharepoint/v3/contenttype/forms"/>
   </ds:schemaRefs>
 </ds:datastoreItem>
 </file>
 
-<file path=customXml/itemProps3.xml><?xml version="1.0" encoding="utf-8"?>
+<file path=customXml/itemProps4.xml><?xml version="1.0" encoding="utf-8"?>
 <ds:datastoreItem xmlns:ds="http://schemas.openxmlformats.org/officeDocument/2006/customXml" ds:itemID="{98FF91B1-8754-4CD5-9632-EF0FFADF1D25}">
   <ds:schemaRefs>
     <ds:schemaRef ds:uri="3b382b5e-089d-4a4c-b0b2-43ff698eeff2"/>
@@ -21815,12 +21823,4 @@
     <ds:schemaRef ds:uri="http://schemas.microsoft.com/sharepoint/v3"/>
   </ds:schemaRefs>
 </ds:datastoreItem>
-</file>
-
-<file path=customXml/itemProps4.xml><?xml version="1.0" encoding="utf-8"?>
-<ds:datastoreItem xmlns:ds="http://schemas.openxmlformats.org/officeDocument/2006/customXml" ds:itemID="{32659024-6793-4229-A8F7-FFA3A70DC1AD}">
-  <ds:schemaRefs>
-    <ds:schemaRef ds:uri="http://schemas.microsoft.com/sharepoint/v3/contenttype/forms"/>
-  </ds:schemaRefs>
-</ds:datastoreItem>
 </file>
</xml_diff>